<commit_message>
add compiler frontend optimization cover.
</commit_message>
<xml_diff>
--- a/Compiler/04.FrontendOpt/06.constant_fold.pptx
+++ b/Compiler/04.FrontendOpt/06.constant_fold.pptx
@@ -10,10 +10,10 @@
     <p:sldMasterId id="2147483881" r:id="rId6"/>
   </p:sldMasterIdLst>
   <p:notesMasterIdLst>
-    <p:notesMasterId r:id="rId25"/>
+    <p:notesMasterId r:id="rId27"/>
   </p:notesMasterIdLst>
   <p:handoutMasterIdLst>
-    <p:handoutMasterId r:id="rId26"/>
+    <p:handoutMasterId r:id="rId28"/>
   </p:handoutMasterIdLst>
   <p:sldIdLst>
     <p:sldId id="1779" r:id="rId7"/>
@@ -31,14 +31,16 @@
     <p:sldId id="2046" r:id="rId19"/>
     <p:sldId id="2047" r:id="rId20"/>
     <p:sldId id="2048" r:id="rId21"/>
-    <p:sldId id="2049" r:id="rId22"/>
-    <p:sldId id="1998" r:id="rId23"/>
-    <p:sldId id="680" r:id="rId24"/>
+    <p:sldId id="2050" r:id="rId22"/>
+    <p:sldId id="2051" r:id="rId23"/>
+    <p:sldId id="2049" r:id="rId24"/>
+    <p:sldId id="1998" r:id="rId25"/>
+    <p:sldId id="680" r:id="rId26"/>
   </p:sldIdLst>
   <p:sldSz cx="12196763" cy="6858000"/>
   <p:notesSz cx="6805613" cy="9939338"/>
   <p:custDataLst>
-    <p:tags r:id="rId27"/>
+    <p:tags r:id="rId29"/>
   </p:custDataLst>
   <p:defaultTextStyle>
     <a:defPPr>
@@ -568,7 +570,7 @@
             <a:fld id="{C45443A1-D8F2-48CD-A659-3CEDBA8DF541}" type="datetimeFigureOut">
               <a:rPr lang="zh-CN" altLang="en-US" smtClean="0"/>
               <a:pPr/>
-              <a:t>2022/12/14</a:t>
+              <a:t>2022/12/16</a:t>
             </a:fld>
             <a:endParaRPr lang="zh-CN" altLang="en-US"/>
           </a:p>
@@ -888,7 +890,7 @@
                 </a:solidFill>
               </a:rPr>
               <a:pPr/>
-              <a:t>18</a:t>
+              <a:t>20</a:t>
             </a:fld>
             <a:endParaRPr lang="en-US" altLang="zh-CN">
               <a:solidFill>
@@ -935,7 +937,7 @@
                 <a:ea typeface="MS PGothic" pitchFamily="34" charset="-128"/>
               </a:rPr>
               <a:pPr algn="r" defTabSz="931863" eaLnBrk="0" hangingPunct="0"/>
-              <a:t>18</a:t>
+              <a:t>20</a:t>
             </a:fld>
             <a:endParaRPr lang="en-US" altLang="zh-CN" sz="1200">
               <a:solidFill>
@@ -40345,7 +40347,7 @@
           <p:cNvPr id="4" name="标题 3">
             <a:extLst>
               <a:ext uri="{FF2B5EF4-FFF2-40B4-BE49-F238E27FC236}">
-                <a16:creationId xmlns:a16="http://schemas.microsoft.com/office/drawing/2014/main" id="{0515527B-D383-DD4B-86BF-75B08A6D988F}"/>
+                <a16:creationId xmlns:a16="http://schemas.microsoft.com/office/drawing/2014/main" id="{989529AF-5934-7249-BF62-8BA5CC7B4FDF}"/>
               </a:ext>
             </a:extLst>
           </p:cNvPr>
@@ -40362,27 +40364,18 @@
           <a:lstStyle/>
           <a:p>
             <a:r>
-              <a:rPr lang="en-US" altLang="zh-CN" dirty="0"/>
-              <a:t>TensorFlow </a:t>
-            </a:r>
-            <a:r>
               <a:rPr lang="zh-CN" altLang="en-US" dirty="0"/>
-              <a:t>常量折叠</a:t>
-            </a:r>
-            <a:r>
-              <a:rPr lang="en-US" altLang="zh-CN" dirty="0"/>
-              <a:t>PASS</a:t>
-            </a:r>
-            <a:endParaRPr lang="zh-CN" altLang="en-US" dirty="0"/>
+              <a:t>分类</a:t>
+            </a:r>
           </a:p>
         </p:txBody>
       </p:sp>
       <p:sp>
         <p:nvSpPr>
-          <p:cNvPr id="3" name="内容占位符 2">
+          <p:cNvPr id="5" name="内容占位符 4">
             <a:extLst>
               <a:ext uri="{FF2B5EF4-FFF2-40B4-BE49-F238E27FC236}">
-                <a16:creationId xmlns:a16="http://schemas.microsoft.com/office/drawing/2014/main" id="{73C400BD-16E4-554E-AB28-AEA62129FA8D}"/>
+                <a16:creationId xmlns:a16="http://schemas.microsoft.com/office/drawing/2014/main" id="{9EE51F3F-1B96-8345-89FA-4E1E65C0D668}"/>
               </a:ext>
             </a:extLst>
           </p:cNvPr>
@@ -40398,7 +40391,7 @@
           <a:bodyPr/>
           <a:lstStyle/>
           <a:p>
-            <a:pPr marL="457200" indent="-457200" eaLnBrk="1" latinLnBrk="1" hangingPunct="1">
+            <a:pPr marL="457200" indent="-457200">
               <a:lnSpc>
                 <a:spcPct val="150000"/>
               </a:lnSpc>
@@ -40407,28 +40400,12 @@
             </a:pPr>
             <a:r>
               <a:rPr lang="zh-CN" altLang="en-US" dirty="0"/>
-              <a:t>先处理</a:t>
-            </a:r>
-            <a:r>
-              <a:rPr lang="en-US" altLang="zh-CN" dirty="0"/>
-              <a:t>“Shape”, “Size”, “Rank”</a:t>
-            </a:r>
-            <a:r>
-              <a:rPr lang="zh-CN" altLang="en-US" dirty="0"/>
-              <a:t>三类运算节点，其输出都取决与输入</a:t>
-            </a:r>
-            <a:r>
-              <a:rPr lang="en-US" altLang="zh-CN" dirty="0"/>
-              <a:t>Tensor</a:t>
-            </a:r>
-            <a:r>
-              <a:rPr lang="zh-CN" altLang="en-US" dirty="0"/>
-              <a:t>的形状，而与具体的输入取值没关系，所以输出可能是可以提前计算出来的。</a:t>
+              <a:t>传统编译器中的常量折叠，找到输入节点均为常量的节点，提前计算出该节点的值来完整替换该节点。</a:t>
             </a:r>
             <a:endParaRPr lang="en-US" altLang="zh-CN" dirty="0"/>
           </a:p>
           <a:p>
-            <a:pPr marL="457200" indent="-457200" eaLnBrk="1" latinLnBrk="1" hangingPunct="1">
+            <a:pPr marL="457200" indent="-457200">
               <a:lnSpc>
                 <a:spcPct val="150000"/>
               </a:lnSpc>
@@ -40437,28 +40414,20 @@
             </a:pPr>
             <a:r>
               <a:rPr lang="zh-CN" altLang="en-US" dirty="0"/>
-              <a:t>把</a:t>
+              <a:t>常量折叠与数据形状 </a:t>
             </a:r>
             <a:r>
               <a:rPr lang="en-US" altLang="zh-CN" dirty="0"/>
-              <a:t>“Shape”, “Size”, “Rank”</a:t>
+              <a:t>shape</a:t>
             </a:r>
             <a:r>
               <a:rPr lang="zh-CN" altLang="en-US" dirty="0"/>
-              <a:t>上述三类运算节点，提前计算出输出值替换成 </a:t>
-            </a:r>
-            <a:r>
-              <a:rPr lang="en-US" altLang="zh-CN" dirty="0"/>
-              <a:t>Const </a:t>
-            </a:r>
-            <a:r>
-              <a:rPr lang="zh-CN" altLang="en-US" dirty="0"/>
-              <a:t>节点，目的是方便后续的常量折叠和替换。</a:t>
+              <a:t> 有关系，通过计算图已有信息推断出形状结果后，用来代替原来的节点。</a:t>
             </a:r>
             <a:endParaRPr lang="en-US" altLang="zh-CN" dirty="0"/>
           </a:p>
           <a:p>
-            <a:pPr marL="457200" indent="-457200" eaLnBrk="1" latinLnBrk="1" hangingPunct="1">
+            <a:pPr marL="457200" indent="-457200">
               <a:lnSpc>
                 <a:spcPct val="150000"/>
               </a:lnSpc>
@@ -40467,92 +40436,7 @@
             </a:pPr>
             <a:r>
               <a:rPr lang="zh-CN" altLang="en-US" dirty="0"/>
-              <a:t>折叠计算图操作：如果一个节点的输入都是常量，那么它的输出也是可以提前计算的，基于这个原理不断地用常量节点替换计算图中的此类节点，直到没有任何可以替换的节点为止。</a:t>
-            </a:r>
-          </a:p>
-          <a:p>
-            <a:pPr marL="457200" indent="-457200" eaLnBrk="1" latinLnBrk="1" hangingPunct="1">
-              <a:lnSpc>
-                <a:spcPct val="150000"/>
-              </a:lnSpc>
-              <a:buFont typeface="+mj-lt"/>
-              <a:buAutoNum type="arabicPeriod"/>
-            </a:pPr>
-            <a:r>
-              <a:rPr lang="zh-CN" altLang="en-US" dirty="0"/>
-              <a:t>处理 </a:t>
-            </a:r>
-            <a:r>
-              <a:rPr lang="en-US" altLang="zh-CN" dirty="0"/>
-              <a:t>Sum,</a:t>
-            </a:r>
-            <a:r>
-              <a:rPr lang="zh-CN" altLang="en-US" dirty="0"/>
-              <a:t> </a:t>
-            </a:r>
-            <a:r>
-              <a:rPr lang="en-US" altLang="zh-CN" dirty="0"/>
-              <a:t>Prod,</a:t>
-            </a:r>
-            <a:r>
-              <a:rPr lang="zh-CN" altLang="en-US" dirty="0"/>
-              <a:t> </a:t>
-            </a:r>
-            <a:r>
-              <a:rPr lang="en-US" altLang="zh-CN" dirty="0"/>
-              <a:t>Min,</a:t>
-            </a:r>
-            <a:r>
-              <a:rPr lang="zh-CN" altLang="en-US" dirty="0"/>
-              <a:t> </a:t>
-            </a:r>
-            <a:r>
-              <a:rPr lang="en-US" altLang="zh-CN" dirty="0"/>
-              <a:t>Max,</a:t>
-            </a:r>
-            <a:r>
-              <a:rPr lang="zh-CN" altLang="en-US" dirty="0"/>
-              <a:t> </a:t>
-            </a:r>
-            <a:r>
-              <a:rPr lang="en-US" altLang="zh-CN" dirty="0"/>
-              <a:t>Mean,</a:t>
-            </a:r>
-            <a:r>
-              <a:rPr lang="zh-CN" altLang="en-US" dirty="0"/>
-              <a:t> </a:t>
-            </a:r>
-            <a:r>
-              <a:rPr lang="en-US" altLang="zh-CN" dirty="0"/>
-              <a:t>Any,</a:t>
-            </a:r>
-            <a:r>
-              <a:rPr lang="zh-CN" altLang="en-US" dirty="0"/>
-              <a:t> </a:t>
-            </a:r>
-            <a:r>
-              <a:rPr lang="en-US" altLang="zh-CN" dirty="0"/>
-              <a:t>All</a:t>
-            </a:r>
-            <a:r>
-              <a:rPr lang="zh-CN" altLang="en-US" dirty="0"/>
-              <a:t> 这几类运算节点，这几类节点的共同点是都沿着输入</a:t>
-            </a:r>
-            <a:r>
-              <a:rPr lang="en-US" altLang="zh-CN" dirty="0"/>
-              <a:t>Tensor</a:t>
-            </a:r>
-            <a:r>
-              <a:rPr lang="zh-CN" altLang="en-US" dirty="0"/>
-              <a:t>的一定维度做一定的运算，或是求和或是求平均等等，将符合一定条件的这几类节点替换为 </a:t>
-            </a:r>
-            <a:r>
-              <a:rPr lang="en-US" altLang="zh-CN" dirty="0"/>
-              <a:t>Identity</a:t>
-            </a:r>
-            <a:r>
-              <a:rPr lang="zh-CN" altLang="en-US" dirty="0"/>
-              <a:t> 节点。</a:t>
+              <a:t>常量折叠与已知常量的代数化简有关。</a:t>
             </a:r>
           </a:p>
         </p:txBody>
@@ -40560,7 +40444,7 @@
     </p:spTree>
     <p:extLst>
       <p:ext uri="{BB962C8B-B14F-4D97-AF65-F5344CB8AC3E}">
-        <p14:creationId xmlns:p14="http://schemas.microsoft.com/office/powerpoint/2010/main" val="3122094522"/>
+        <p14:creationId xmlns:p14="http://schemas.microsoft.com/office/powerpoint/2010/main" val="3342665885"/>
       </p:ext>
     </p:extLst>
   </p:cSld>
@@ -40601,10 +40485,10 @@
       </p:grpSpPr>
       <p:sp>
         <p:nvSpPr>
-          <p:cNvPr id="2" name="标题 1">
+          <p:cNvPr id="4" name="标题 3">
             <a:extLst>
               <a:ext uri="{FF2B5EF4-FFF2-40B4-BE49-F238E27FC236}">
-                <a16:creationId xmlns:a16="http://schemas.microsoft.com/office/drawing/2014/main" id="{7BB696E5-12D9-1645-986E-3F2230DDAB58}"/>
+                <a16:creationId xmlns:a16="http://schemas.microsoft.com/office/drawing/2014/main" id="{989529AF-5934-7249-BF62-8BA5CC7B4FDF}"/>
               </a:ext>
             </a:extLst>
           </p:cNvPr>
@@ -40621,19 +40505,18 @@
           <a:lstStyle/>
           <a:p>
             <a:r>
-              <a:rPr kumimoji="1" lang="en-US" altLang="zh-CN" dirty="0"/>
-              <a:t>Reference</a:t>
-            </a:r>
-            <a:endParaRPr kumimoji="1" lang="zh-CN" altLang="en-US" dirty="0"/>
+              <a:rPr lang="zh-CN" altLang="en-US" dirty="0"/>
+              <a:t>分类</a:t>
+            </a:r>
           </a:p>
         </p:txBody>
       </p:sp>
       <p:sp>
         <p:nvSpPr>
-          <p:cNvPr id="3" name="内容占位符 2">
+          <p:cNvPr id="5" name="内容占位符 4">
             <a:extLst>
               <a:ext uri="{FF2B5EF4-FFF2-40B4-BE49-F238E27FC236}">
-                <a16:creationId xmlns:a16="http://schemas.microsoft.com/office/drawing/2014/main" id="{7AFE82E5-A73A-6F43-8864-9BEA47F5F0CD}"/>
+                <a16:creationId xmlns:a16="http://schemas.microsoft.com/office/drawing/2014/main" id="{9EE51F3F-1B96-8345-89FA-4E1E65C0D668}"/>
               </a:ext>
             </a:extLst>
           </p:cNvPr>
@@ -40649,121 +40532,60 @@
           <a:bodyPr/>
           <a:lstStyle/>
           <a:p>
-            <a:pPr latinLnBrk="1">
+            <a:pPr marL="457200" indent="-457200">
+              <a:lnSpc>
+                <a:spcPct val="150000"/>
+              </a:lnSpc>
               <a:buFont typeface="+mj-lt"/>
               <a:buAutoNum type="arabicPeriod"/>
             </a:pPr>
             <a:r>
-              <a:rPr lang="zh-CN" altLang="en-US" sz="1200" dirty="0">
-                <a:latin typeface="Gill Sans MT" panose="020B0502020104020203" pitchFamily="34" charset="0"/>
-                <a:ea typeface="Microsoft YaHei" panose="020B0503020204020204" pitchFamily="34" charset="-122"/>
-              </a:rPr>
-              <a:t>编译器优化 </a:t>
-            </a:r>
-            <a:r>
-              <a:rPr lang="en-US" altLang="zh-CN" sz="1200" dirty="0">
-                <a:latin typeface="Gill Sans MT" panose="020B0502020104020203" pitchFamily="34" charset="0"/>
-                <a:ea typeface="Microsoft YaHei" panose="020B0503020204020204" pitchFamily="34" charset="-122"/>
-              </a:rPr>
-              <a:t>-- </a:t>
-            </a:r>
-            <a:r>
-              <a:rPr lang="zh-CN" altLang="en-US" sz="1200" dirty="0">
-                <a:latin typeface="Gill Sans MT" panose="020B0502020104020203" pitchFamily="34" charset="0"/>
-                <a:ea typeface="Microsoft YaHei" panose="020B0503020204020204" pitchFamily="34" charset="-122"/>
-              </a:rPr>
-              <a:t>常量折叠</a:t>
-            </a:r>
-            <a:r>
-              <a:rPr lang="en-US" altLang="zh-CN" sz="1200" dirty="0">
-                <a:latin typeface="Gill Sans MT" panose="020B0502020104020203" pitchFamily="34" charset="0"/>
-                <a:ea typeface="Microsoft YaHei" panose="020B0503020204020204" pitchFamily="34" charset="-122"/>
-              </a:rPr>
-              <a:t> </a:t>
-            </a:r>
-            <a:r>
-              <a:rPr lang="en-US" altLang="zh-CN" sz="1200" dirty="0">
-                <a:latin typeface="Gill Sans MT" panose="020B0502020104020203" pitchFamily="34" charset="0"/>
-                <a:ea typeface="Microsoft YaHei" panose="020B0503020204020204" pitchFamily="34" charset="-122"/>
-                <a:hlinkClick r:id="rId2"/>
-              </a:rPr>
-              <a:t>https://blog.caoxudong.info/blog/2013/10/23/compiler_optimizations_constant_folding</a:t>
-            </a:r>
-            <a:endParaRPr lang="en-US" altLang="zh-CN" sz="1200" dirty="0">
-              <a:latin typeface="Gill Sans MT" panose="020B0502020104020203" pitchFamily="34" charset="0"/>
-              <a:ea typeface="Microsoft YaHei" panose="020B0503020204020204" pitchFamily="34" charset="-122"/>
-            </a:endParaRPr>
+              <a:rPr lang="zh-CN" altLang="en-US" dirty="0"/>
+              <a:t>传统编译器中的常量折叠，找到输入节点均为常量的节点，提前计算出该节点的值来完整替换该节点。</a:t>
+            </a:r>
+            <a:endParaRPr lang="en-US" altLang="zh-CN" dirty="0"/>
           </a:p>
           <a:p>
-            <a:pPr latinLnBrk="1">
+            <a:pPr marL="457200" indent="-457200">
+              <a:lnSpc>
+                <a:spcPct val="150000"/>
+              </a:lnSpc>
               <a:buFont typeface="+mj-lt"/>
               <a:buAutoNum type="arabicPeriod"/>
             </a:pPr>
             <a:r>
-              <a:rPr lang="zh-CN" altLang="en-US" sz="1200" dirty="0">
-                <a:latin typeface="Gill Sans MT" panose="020B0502020104020203" pitchFamily="34" charset="0"/>
-                <a:ea typeface="Microsoft YaHei" panose="020B0503020204020204" pitchFamily="34" charset="-122"/>
-              </a:rPr>
-              <a:t>神经网络编译器</a:t>
-            </a:r>
-            <a:r>
-              <a:rPr lang="en-US" altLang="zh-CN" sz="1200" dirty="0">
-                <a:latin typeface="Gill Sans MT" panose="020B0502020104020203" pitchFamily="34" charset="0"/>
-                <a:ea typeface="Microsoft YaHei" panose="020B0503020204020204" pitchFamily="34" charset="-122"/>
-              </a:rPr>
-              <a:t>-</a:t>
-            </a:r>
-            <a:r>
-              <a:rPr lang="zh-CN" altLang="en-US" sz="1200" dirty="0">
-                <a:latin typeface="Gill Sans MT" panose="020B0502020104020203" pitchFamily="34" charset="0"/>
-                <a:ea typeface="Microsoft YaHei" panose="020B0503020204020204" pitchFamily="34" charset="-122"/>
-              </a:rPr>
-              <a:t>常量折叠</a:t>
-            </a:r>
-            <a:r>
-              <a:rPr lang="en-US" altLang="zh-CN" sz="1200" dirty="0">
-                <a:latin typeface="Gill Sans MT" panose="020B0502020104020203" pitchFamily="34" charset="0"/>
-                <a:ea typeface="Microsoft YaHei" panose="020B0503020204020204" pitchFamily="34" charset="-122"/>
-              </a:rPr>
-              <a:t> </a:t>
-            </a:r>
-            <a:r>
-              <a:rPr lang="en-US" altLang="zh-CN" sz="1200" dirty="0">
-                <a:latin typeface="Gill Sans MT" panose="020B0502020104020203" pitchFamily="34" charset="0"/>
-                <a:ea typeface="Microsoft YaHei" panose="020B0503020204020204" pitchFamily="34" charset="-122"/>
-                <a:hlinkClick r:id="rId3"/>
-              </a:rPr>
-              <a:t>https://blog.csdn.net/free1993/article/details/111480268</a:t>
-            </a:r>
-            <a:endParaRPr lang="en-US" altLang="zh-CN" sz="1200" dirty="0">
-              <a:latin typeface="Gill Sans MT" panose="020B0502020104020203" pitchFamily="34" charset="0"/>
-              <a:ea typeface="Microsoft YaHei" panose="020B0503020204020204" pitchFamily="34" charset="-122"/>
-            </a:endParaRPr>
+              <a:rPr lang="zh-CN" altLang="en-US" dirty="0"/>
+              <a:t>常量折叠与数据形状 </a:t>
+            </a:r>
+            <a:r>
+              <a:rPr lang="en-US" altLang="zh-CN" dirty="0"/>
+              <a:t>shape</a:t>
+            </a:r>
+            <a:r>
+              <a:rPr lang="zh-CN" altLang="en-US" dirty="0"/>
+              <a:t> 有关系，通过计算图已有信息推断出形状结果后，用来代替原来的节点。</a:t>
+            </a:r>
+            <a:endParaRPr lang="en-US" altLang="zh-CN" dirty="0"/>
           </a:p>
           <a:p>
-            <a:pPr>
+            <a:pPr marL="457200" indent="-457200">
+              <a:lnSpc>
+                <a:spcPct val="150000"/>
+              </a:lnSpc>
               <a:buFont typeface="+mj-lt"/>
               <a:buAutoNum type="arabicPeriod"/>
             </a:pPr>
             <a:r>
-              <a:rPr lang="en-US" altLang="zh-CN" sz="1200" u="sng" dirty="0">
-                <a:latin typeface="Gill Sans MT" panose="020B0502020104020203" pitchFamily="34" charset="0"/>
-                <a:ea typeface="Microsoft YaHei" panose="020B0503020204020204" pitchFamily="34" charset="-122"/>
-                <a:hlinkClick r:id="rId4"/>
-              </a:rPr>
-              <a:t>https://en.wikipedia.org/wiki/Constant_folding</a:t>
-            </a:r>
-            <a:endParaRPr lang="en-US" altLang="zh-CN" sz="1200" dirty="0">
-              <a:latin typeface="Gill Sans MT" panose="020B0502020104020203" pitchFamily="34" charset="0"/>
-              <a:ea typeface="Microsoft YaHei" panose="020B0503020204020204" pitchFamily="34" charset="-122"/>
-            </a:endParaRPr>
+              <a:rPr lang="zh-CN" altLang="en-US" dirty="0"/>
+              <a:t>常量折叠与已知常量的代数化简有关。</a:t>
+            </a:r>
           </a:p>
         </p:txBody>
       </p:sp>
     </p:spTree>
     <p:extLst>
       <p:ext uri="{BB962C8B-B14F-4D97-AF65-F5344CB8AC3E}">
-        <p14:creationId xmlns:p14="http://schemas.microsoft.com/office/powerpoint/2010/main" val="843830938"/>
+        <p14:creationId xmlns:p14="http://schemas.microsoft.com/office/powerpoint/2010/main" val="3130792303"/>
       </p:ext>
     </p:extLst>
   </p:cSld>
@@ -40772,7 +40594,7 @@
   </p:clrMapOvr>
   <mc:AlternateContent xmlns:mc="http://schemas.openxmlformats.org/markup-compatibility/2006" xmlns:p159="http://schemas.microsoft.com/office/powerpoint/2015/09/main">
     <mc:Choice Requires="p159">
-      <p:transition spd="slow" advClick="0">
+      <p:transition xmlns:p14="http://schemas.microsoft.com/office/powerpoint/2010/main" spd="slow" p14:dur="2000" advClick="0">
         <p159:morph option="byObject"/>
       </p:transition>
     </mc:Choice>
@@ -40802,10 +40624,430 @@
           <a:chExt cx="0" cy="0"/>
         </a:xfrm>
       </p:grpSpPr>
+      <p:sp>
+        <p:nvSpPr>
+          <p:cNvPr id="4" name="标题 3">
+            <a:extLst>
+              <a:ext uri="{FF2B5EF4-FFF2-40B4-BE49-F238E27FC236}">
+                <a16:creationId xmlns:a16="http://schemas.microsoft.com/office/drawing/2014/main" id="{0515527B-D383-DD4B-86BF-75B08A6D988F}"/>
+              </a:ext>
+            </a:extLst>
+          </p:cNvPr>
+          <p:cNvSpPr>
+            <a:spLocks noGrp="1"/>
+          </p:cNvSpPr>
+          <p:nvPr>
+            <p:ph type="title"/>
+          </p:nvPr>
+        </p:nvSpPr>
+        <p:spPr/>
+        <p:txBody>
+          <a:bodyPr/>
+          <a:lstStyle/>
+          <a:p>
+            <a:r>
+              <a:rPr lang="en-US" altLang="zh-CN" dirty="0"/>
+              <a:t>TensorFlow </a:t>
+            </a:r>
+            <a:r>
+              <a:rPr lang="zh-CN" altLang="en-US" dirty="0"/>
+              <a:t>常量折叠</a:t>
+            </a:r>
+            <a:r>
+              <a:rPr lang="en-US" altLang="zh-CN" dirty="0"/>
+              <a:t>PASS</a:t>
+            </a:r>
+            <a:endParaRPr lang="zh-CN" altLang="en-US" dirty="0"/>
+          </a:p>
+        </p:txBody>
+      </p:sp>
+      <p:sp>
+        <p:nvSpPr>
+          <p:cNvPr id="3" name="内容占位符 2">
+            <a:extLst>
+              <a:ext uri="{FF2B5EF4-FFF2-40B4-BE49-F238E27FC236}">
+                <a16:creationId xmlns:a16="http://schemas.microsoft.com/office/drawing/2014/main" id="{73C400BD-16E4-554E-AB28-AEA62129FA8D}"/>
+              </a:ext>
+            </a:extLst>
+          </p:cNvPr>
+          <p:cNvSpPr>
+            <a:spLocks noGrp="1"/>
+          </p:cNvSpPr>
+          <p:nvPr>
+            <p:ph sz="half" idx="1"/>
+          </p:nvPr>
+        </p:nvSpPr>
+        <p:spPr/>
+        <p:txBody>
+          <a:bodyPr/>
+          <a:lstStyle/>
+          <a:p>
+            <a:pPr marL="457200" indent="-457200" eaLnBrk="1" latinLnBrk="1" hangingPunct="1">
+              <a:lnSpc>
+                <a:spcPct val="150000"/>
+              </a:lnSpc>
+              <a:buFont typeface="+mj-lt"/>
+              <a:buAutoNum type="arabicPeriod"/>
+            </a:pPr>
+            <a:r>
+              <a:rPr lang="zh-CN" altLang="en-US" dirty="0"/>
+              <a:t>先处理</a:t>
+            </a:r>
+            <a:r>
+              <a:rPr lang="en-US" altLang="zh-CN" dirty="0"/>
+              <a:t>“Shape”, “Size”, “Rank”</a:t>
+            </a:r>
+            <a:r>
+              <a:rPr lang="zh-CN" altLang="en-US" dirty="0"/>
+              <a:t>三类运算节点，其输出都取决与输入</a:t>
+            </a:r>
+            <a:r>
+              <a:rPr lang="en-US" altLang="zh-CN" dirty="0"/>
+              <a:t>Tensor</a:t>
+            </a:r>
+            <a:r>
+              <a:rPr lang="zh-CN" altLang="en-US" dirty="0"/>
+              <a:t>的形状，而与具体的输入取值没关系，所以输出可能是可以提前计算出来的。</a:t>
+            </a:r>
+            <a:endParaRPr lang="en-US" altLang="zh-CN" dirty="0"/>
+          </a:p>
+          <a:p>
+            <a:pPr marL="457200" indent="-457200" eaLnBrk="1" latinLnBrk="1" hangingPunct="1">
+              <a:lnSpc>
+                <a:spcPct val="150000"/>
+              </a:lnSpc>
+              <a:buFont typeface="+mj-lt"/>
+              <a:buAutoNum type="arabicPeriod"/>
+            </a:pPr>
+            <a:r>
+              <a:rPr lang="zh-CN" altLang="en-US" dirty="0"/>
+              <a:t>把</a:t>
+            </a:r>
+            <a:r>
+              <a:rPr lang="en-US" altLang="zh-CN" dirty="0"/>
+              <a:t>“Shape”, “Size”, “Rank”</a:t>
+            </a:r>
+            <a:r>
+              <a:rPr lang="zh-CN" altLang="en-US" dirty="0"/>
+              <a:t>上述三类运算节点，提前计算出输出值替换成 </a:t>
+            </a:r>
+            <a:r>
+              <a:rPr lang="en-US" altLang="zh-CN" dirty="0"/>
+              <a:t>Const </a:t>
+            </a:r>
+            <a:r>
+              <a:rPr lang="zh-CN" altLang="en-US" dirty="0"/>
+              <a:t>节点，目的是方便后续的常量折叠和替换。</a:t>
+            </a:r>
+            <a:endParaRPr lang="en-US" altLang="zh-CN" dirty="0"/>
+          </a:p>
+          <a:p>
+            <a:pPr marL="457200" indent="-457200" eaLnBrk="1" latinLnBrk="1" hangingPunct="1">
+              <a:lnSpc>
+                <a:spcPct val="150000"/>
+              </a:lnSpc>
+              <a:buFont typeface="+mj-lt"/>
+              <a:buAutoNum type="arabicPeriod"/>
+            </a:pPr>
+            <a:r>
+              <a:rPr lang="zh-CN" altLang="en-US" dirty="0"/>
+              <a:t>折叠计算图操作：如果一个节点的输入都是常量，那么它的输出也是可以提前计算的，基于这个原理不断地用常量节点替换计算图中的此类节点，直到没有任何可以替换的节点为止。</a:t>
+            </a:r>
+          </a:p>
+          <a:p>
+            <a:pPr marL="457200" indent="-457200" eaLnBrk="1" latinLnBrk="1" hangingPunct="1">
+              <a:lnSpc>
+                <a:spcPct val="150000"/>
+              </a:lnSpc>
+              <a:buFont typeface="+mj-lt"/>
+              <a:buAutoNum type="arabicPeriod"/>
+            </a:pPr>
+            <a:r>
+              <a:rPr lang="zh-CN" altLang="en-US" dirty="0"/>
+              <a:t>处理 </a:t>
+            </a:r>
+            <a:r>
+              <a:rPr lang="en-US" altLang="zh-CN" dirty="0"/>
+              <a:t>Sum,</a:t>
+            </a:r>
+            <a:r>
+              <a:rPr lang="zh-CN" altLang="en-US" dirty="0"/>
+              <a:t> </a:t>
+            </a:r>
+            <a:r>
+              <a:rPr lang="en-US" altLang="zh-CN" dirty="0"/>
+              <a:t>Prod,</a:t>
+            </a:r>
+            <a:r>
+              <a:rPr lang="zh-CN" altLang="en-US" dirty="0"/>
+              <a:t> </a:t>
+            </a:r>
+            <a:r>
+              <a:rPr lang="en-US" altLang="zh-CN" dirty="0"/>
+              <a:t>Min,</a:t>
+            </a:r>
+            <a:r>
+              <a:rPr lang="zh-CN" altLang="en-US" dirty="0"/>
+              <a:t> </a:t>
+            </a:r>
+            <a:r>
+              <a:rPr lang="en-US" altLang="zh-CN" dirty="0"/>
+              <a:t>Max,</a:t>
+            </a:r>
+            <a:r>
+              <a:rPr lang="zh-CN" altLang="en-US" dirty="0"/>
+              <a:t> </a:t>
+            </a:r>
+            <a:r>
+              <a:rPr lang="en-US" altLang="zh-CN" dirty="0"/>
+              <a:t>Mean,</a:t>
+            </a:r>
+            <a:r>
+              <a:rPr lang="zh-CN" altLang="en-US" dirty="0"/>
+              <a:t> </a:t>
+            </a:r>
+            <a:r>
+              <a:rPr lang="en-US" altLang="zh-CN" dirty="0"/>
+              <a:t>Any,</a:t>
+            </a:r>
+            <a:r>
+              <a:rPr lang="zh-CN" altLang="en-US" dirty="0"/>
+              <a:t> </a:t>
+            </a:r>
+            <a:r>
+              <a:rPr lang="en-US" altLang="zh-CN" dirty="0"/>
+              <a:t>All</a:t>
+            </a:r>
+            <a:r>
+              <a:rPr lang="zh-CN" altLang="en-US" dirty="0"/>
+              <a:t> 这几类运算节点，这几类节点的共同点是都沿着输入</a:t>
+            </a:r>
+            <a:r>
+              <a:rPr lang="en-US" altLang="zh-CN" dirty="0"/>
+              <a:t>Tensor</a:t>
+            </a:r>
+            <a:r>
+              <a:rPr lang="zh-CN" altLang="en-US" dirty="0"/>
+              <a:t>的一定维度做一定的运算，或是求和或是求平均等等，将符合一定条件的这几类节点替换为 </a:t>
+            </a:r>
+            <a:r>
+              <a:rPr lang="en-US" altLang="zh-CN" dirty="0"/>
+              <a:t>Identity</a:t>
+            </a:r>
+            <a:r>
+              <a:rPr lang="zh-CN" altLang="en-US" dirty="0"/>
+              <a:t> 节点。</a:t>
+            </a:r>
+          </a:p>
+        </p:txBody>
+      </p:sp>
     </p:spTree>
     <p:extLst>
       <p:ext uri="{BB962C8B-B14F-4D97-AF65-F5344CB8AC3E}">
-        <p14:creationId xmlns:p14="http://schemas.microsoft.com/office/powerpoint/2010/main" val="2327015185"/>
+        <p14:creationId xmlns:p14="http://schemas.microsoft.com/office/powerpoint/2010/main" val="3122094522"/>
+      </p:ext>
+    </p:extLst>
+  </p:cSld>
+  <p:clrMapOvr>
+    <a:masterClrMapping/>
+  </p:clrMapOvr>
+  <mc:AlternateContent xmlns:mc="http://schemas.openxmlformats.org/markup-compatibility/2006" xmlns:p159="http://schemas.microsoft.com/office/powerpoint/2015/09/main">
+    <mc:Choice Requires="p159">
+      <p:transition xmlns:p14="http://schemas.microsoft.com/office/powerpoint/2010/main" spd="slow" p14:dur="2000" advClick="0">
+        <p159:morph option="byObject"/>
+      </p:transition>
+    </mc:Choice>
+    <mc:Fallback xmlns="">
+      <p:transition spd="slow" advClick="0">
+        <p:fade/>
+      </p:transition>
+    </mc:Fallback>
+  </mc:AlternateContent>
+</p:sld>
+</file>
+
+<file path=ppt/slides/slide19.xml><?xml version="1.0" encoding="utf-8"?>
+<p:sld xmlns:a="http://schemas.openxmlformats.org/drawingml/2006/main" xmlns:r="http://schemas.openxmlformats.org/officeDocument/2006/relationships" xmlns:p="http://schemas.openxmlformats.org/presentationml/2006/main">
+  <p:cSld>
+    <p:spTree>
+      <p:nvGrpSpPr>
+        <p:cNvPr id="1" name=""/>
+        <p:cNvGrpSpPr/>
+        <p:nvPr/>
+      </p:nvGrpSpPr>
+      <p:grpSpPr>
+        <a:xfrm>
+          <a:off x="0" y="0"/>
+          <a:ext cx="0" cy="0"/>
+          <a:chOff x="0" y="0"/>
+          <a:chExt cx="0" cy="0"/>
+        </a:xfrm>
+      </p:grpSpPr>
+      <p:sp>
+        <p:nvSpPr>
+          <p:cNvPr id="2" name="标题 1">
+            <a:extLst>
+              <a:ext uri="{FF2B5EF4-FFF2-40B4-BE49-F238E27FC236}">
+                <a16:creationId xmlns:a16="http://schemas.microsoft.com/office/drawing/2014/main" id="{7BB696E5-12D9-1645-986E-3F2230DDAB58}"/>
+              </a:ext>
+            </a:extLst>
+          </p:cNvPr>
+          <p:cNvSpPr>
+            <a:spLocks noGrp="1"/>
+          </p:cNvSpPr>
+          <p:nvPr>
+            <p:ph type="title"/>
+          </p:nvPr>
+        </p:nvSpPr>
+        <p:spPr/>
+        <p:txBody>
+          <a:bodyPr/>
+          <a:lstStyle/>
+          <a:p>
+            <a:r>
+              <a:rPr kumimoji="1" lang="en-US" altLang="zh-CN" dirty="0"/>
+              <a:t>Reference</a:t>
+            </a:r>
+            <a:endParaRPr kumimoji="1" lang="zh-CN" altLang="en-US" dirty="0"/>
+          </a:p>
+        </p:txBody>
+      </p:sp>
+      <p:sp>
+        <p:nvSpPr>
+          <p:cNvPr id="3" name="内容占位符 2">
+            <a:extLst>
+              <a:ext uri="{FF2B5EF4-FFF2-40B4-BE49-F238E27FC236}">
+                <a16:creationId xmlns:a16="http://schemas.microsoft.com/office/drawing/2014/main" id="{7AFE82E5-A73A-6F43-8864-9BEA47F5F0CD}"/>
+              </a:ext>
+            </a:extLst>
+          </p:cNvPr>
+          <p:cNvSpPr>
+            <a:spLocks noGrp="1"/>
+          </p:cNvSpPr>
+          <p:nvPr>
+            <p:ph sz="half" idx="1"/>
+          </p:nvPr>
+        </p:nvSpPr>
+        <p:spPr/>
+        <p:txBody>
+          <a:bodyPr/>
+          <a:lstStyle/>
+          <a:p>
+            <a:pPr latinLnBrk="1">
+              <a:buFont typeface="+mj-lt"/>
+              <a:buAutoNum type="arabicPeriod"/>
+            </a:pPr>
+            <a:r>
+              <a:rPr lang="zh-CN" altLang="en-US" sz="1200" dirty="0">
+                <a:latin typeface="Gill Sans MT" panose="020B0502020104020203" pitchFamily="34" charset="0"/>
+                <a:ea typeface="Microsoft YaHei" panose="020B0503020204020204" pitchFamily="34" charset="-122"/>
+              </a:rPr>
+              <a:t>编译器优化 </a:t>
+            </a:r>
+            <a:r>
+              <a:rPr lang="en-US" altLang="zh-CN" sz="1200" dirty="0">
+                <a:latin typeface="Gill Sans MT" panose="020B0502020104020203" pitchFamily="34" charset="0"/>
+                <a:ea typeface="Microsoft YaHei" panose="020B0503020204020204" pitchFamily="34" charset="-122"/>
+              </a:rPr>
+              <a:t>-- </a:t>
+            </a:r>
+            <a:r>
+              <a:rPr lang="zh-CN" altLang="en-US" sz="1200" dirty="0">
+                <a:latin typeface="Gill Sans MT" panose="020B0502020104020203" pitchFamily="34" charset="0"/>
+                <a:ea typeface="Microsoft YaHei" panose="020B0503020204020204" pitchFamily="34" charset="-122"/>
+              </a:rPr>
+              <a:t>常量折叠</a:t>
+            </a:r>
+            <a:r>
+              <a:rPr lang="en-US" altLang="zh-CN" sz="1200" dirty="0">
+                <a:latin typeface="Gill Sans MT" panose="020B0502020104020203" pitchFamily="34" charset="0"/>
+                <a:ea typeface="Microsoft YaHei" panose="020B0503020204020204" pitchFamily="34" charset="-122"/>
+              </a:rPr>
+              <a:t> </a:t>
+            </a:r>
+            <a:r>
+              <a:rPr lang="en-US" altLang="zh-CN" sz="1200" dirty="0">
+                <a:latin typeface="Gill Sans MT" panose="020B0502020104020203" pitchFamily="34" charset="0"/>
+                <a:ea typeface="Microsoft YaHei" panose="020B0503020204020204" pitchFamily="34" charset="-122"/>
+                <a:hlinkClick r:id="rId2"/>
+              </a:rPr>
+              <a:t>https://blog.caoxudong.info/blog/2013/10/23/compiler_optimizations_constant_folding</a:t>
+            </a:r>
+            <a:endParaRPr lang="en-US" altLang="zh-CN" sz="1200" dirty="0">
+              <a:latin typeface="Gill Sans MT" panose="020B0502020104020203" pitchFamily="34" charset="0"/>
+              <a:ea typeface="Microsoft YaHei" panose="020B0503020204020204" pitchFamily="34" charset="-122"/>
+            </a:endParaRPr>
+          </a:p>
+          <a:p>
+            <a:pPr latinLnBrk="1">
+              <a:buFont typeface="+mj-lt"/>
+              <a:buAutoNum type="arabicPeriod"/>
+            </a:pPr>
+            <a:r>
+              <a:rPr lang="zh-CN" altLang="en-US" sz="1200" dirty="0">
+                <a:latin typeface="Gill Sans MT" panose="020B0502020104020203" pitchFamily="34" charset="0"/>
+                <a:ea typeface="Microsoft YaHei" panose="020B0503020204020204" pitchFamily="34" charset="-122"/>
+              </a:rPr>
+              <a:t>神经网络编译器</a:t>
+            </a:r>
+            <a:r>
+              <a:rPr lang="en-US" altLang="zh-CN" sz="1200" dirty="0">
+                <a:latin typeface="Gill Sans MT" panose="020B0502020104020203" pitchFamily="34" charset="0"/>
+                <a:ea typeface="Microsoft YaHei" panose="020B0503020204020204" pitchFamily="34" charset="-122"/>
+              </a:rPr>
+              <a:t>-</a:t>
+            </a:r>
+            <a:r>
+              <a:rPr lang="zh-CN" altLang="en-US" sz="1200" dirty="0">
+                <a:latin typeface="Gill Sans MT" panose="020B0502020104020203" pitchFamily="34" charset="0"/>
+                <a:ea typeface="Microsoft YaHei" panose="020B0503020204020204" pitchFamily="34" charset="-122"/>
+              </a:rPr>
+              <a:t>常量折叠</a:t>
+            </a:r>
+            <a:r>
+              <a:rPr lang="en-US" altLang="zh-CN" sz="1200" dirty="0">
+                <a:latin typeface="Gill Sans MT" panose="020B0502020104020203" pitchFamily="34" charset="0"/>
+                <a:ea typeface="Microsoft YaHei" panose="020B0503020204020204" pitchFamily="34" charset="-122"/>
+              </a:rPr>
+              <a:t> </a:t>
+            </a:r>
+            <a:r>
+              <a:rPr lang="en-US" altLang="zh-CN" sz="1200" dirty="0">
+                <a:latin typeface="Gill Sans MT" panose="020B0502020104020203" pitchFamily="34" charset="0"/>
+                <a:ea typeface="Microsoft YaHei" panose="020B0503020204020204" pitchFamily="34" charset="-122"/>
+                <a:hlinkClick r:id="rId3"/>
+              </a:rPr>
+              <a:t>https://blog.csdn.net/free1993/article/details/111480268</a:t>
+            </a:r>
+            <a:endParaRPr lang="en-US" altLang="zh-CN" sz="1200" dirty="0">
+              <a:latin typeface="Gill Sans MT" panose="020B0502020104020203" pitchFamily="34" charset="0"/>
+              <a:ea typeface="Microsoft YaHei" panose="020B0503020204020204" pitchFamily="34" charset="-122"/>
+            </a:endParaRPr>
+          </a:p>
+          <a:p>
+            <a:pPr>
+              <a:buFont typeface="+mj-lt"/>
+              <a:buAutoNum type="arabicPeriod"/>
+            </a:pPr>
+            <a:r>
+              <a:rPr lang="en-US" altLang="zh-CN" sz="1200" u="sng" dirty="0">
+                <a:latin typeface="Gill Sans MT" panose="020B0502020104020203" pitchFamily="34" charset="0"/>
+                <a:ea typeface="Microsoft YaHei" panose="020B0503020204020204" pitchFamily="34" charset="-122"/>
+                <a:hlinkClick r:id="rId4"/>
+              </a:rPr>
+              <a:t>https://en.wikipedia.org/wiki/Constant_folding</a:t>
+            </a:r>
+            <a:endParaRPr lang="en-US" altLang="zh-CN" sz="1200" dirty="0">
+              <a:latin typeface="Gill Sans MT" panose="020B0502020104020203" pitchFamily="34" charset="0"/>
+              <a:ea typeface="Microsoft YaHei" panose="020B0503020204020204" pitchFamily="34" charset="-122"/>
+            </a:endParaRPr>
+          </a:p>
+        </p:txBody>
+      </p:sp>
+    </p:spTree>
+    <p:extLst>
+      <p:ext uri="{BB962C8B-B14F-4D97-AF65-F5344CB8AC3E}">
+        <p14:creationId xmlns:p14="http://schemas.microsoft.com/office/powerpoint/2010/main" val="843830938"/>
       </p:ext>
     </p:extLst>
   </p:cSld>
@@ -42019,6 +42261,48 @@
     <p:extLst>
       <p:ext uri="{BB962C8B-B14F-4D97-AF65-F5344CB8AC3E}">
         <p14:creationId xmlns:p14="http://schemas.microsoft.com/office/powerpoint/2010/main" val="2859959283"/>
+      </p:ext>
+    </p:extLst>
+  </p:cSld>
+  <p:clrMapOvr>
+    <a:masterClrMapping/>
+  </p:clrMapOvr>
+  <mc:AlternateContent xmlns:mc="http://schemas.openxmlformats.org/markup-compatibility/2006" xmlns:p159="http://schemas.microsoft.com/office/powerpoint/2015/09/main">
+    <mc:Choice Requires="p159">
+      <p:transition spd="slow" advClick="0">
+        <p159:morph option="byObject"/>
+      </p:transition>
+    </mc:Choice>
+    <mc:Fallback xmlns="">
+      <p:transition spd="slow" advClick="0">
+        <p:fade/>
+      </p:transition>
+    </mc:Fallback>
+  </mc:AlternateContent>
+</p:sld>
+</file>
+
+<file path=ppt/slides/slide20.xml><?xml version="1.0" encoding="utf-8"?>
+<p:sld xmlns:a="http://schemas.openxmlformats.org/drawingml/2006/main" xmlns:r="http://schemas.openxmlformats.org/officeDocument/2006/relationships" xmlns:p="http://schemas.openxmlformats.org/presentationml/2006/main">
+  <p:cSld>
+    <p:spTree>
+      <p:nvGrpSpPr>
+        <p:cNvPr id="1" name=""/>
+        <p:cNvGrpSpPr/>
+        <p:nvPr/>
+      </p:nvGrpSpPr>
+      <p:grpSpPr>
+        <a:xfrm>
+          <a:off x="0" y="0"/>
+          <a:ext cx="0" cy="0"/>
+          <a:chOff x="0" y="0"/>
+          <a:chExt cx="0" cy="0"/>
+        </a:xfrm>
+      </p:grpSpPr>
+    </p:spTree>
+    <p:extLst>
+      <p:ext uri="{BB962C8B-B14F-4D97-AF65-F5344CB8AC3E}">
+        <p14:creationId xmlns:p14="http://schemas.microsoft.com/office/powerpoint/2010/main" val="2327015185"/>
       </p:ext>
     </p:extLst>
   </p:cSld>

</xml_diff>